<commit_message>
Presentation adding to first draft
</commit_message>
<xml_diff>
--- a/PaperPresentation.pptx
+++ b/PaperPresentation.pptx
@@ -12,6 +12,9 @@
     <p:sldId id="260" r:id="rId6"/>
     <p:sldId id="261" r:id="rId7"/>
     <p:sldId id="262" r:id="rId8"/>
+    <p:sldId id="263" r:id="rId9"/>
+    <p:sldId id="264" r:id="rId10"/>
+    <p:sldId id="265" r:id="rId11"/>
   </p:sldIdLst>
   <p:sldSz cx="12192000" cy="6858000"/>
   <p:notesSz cx="6858000" cy="9144000"/>
@@ -3001,11 +3004,11 @@
               <a:t>IoT</a:t>
             </a:r>
             <a:r>
-              <a:rPr lang="en-US" smtClean="0"/>
+              <a:rPr lang="en-US" dirty="0" smtClean="0"/>
               <a:t> </a:t>
             </a:r>
             <a:r>
-              <a:rPr lang="en-US" smtClean="0"/>
+              <a:rPr lang="en-US" dirty="0" smtClean="0"/>
               <a:t>Ecosystem</a:t>
             </a:r>
             <a:endParaRPr lang="en-US" dirty="0"/>
@@ -3093,6 +3096,78 @@
     <p:extLst>
       <p:ext uri="{BB962C8B-B14F-4D97-AF65-F5344CB8AC3E}">
         <p14:creationId xmlns:p14="http://schemas.microsoft.com/office/powerpoint/2010/main" val="2868535410"/>
+      </p:ext>
+    </p:extLst>
+  </p:cSld>
+  <p:clrMapOvr>
+    <a:masterClrMapping/>
+  </p:clrMapOvr>
+</p:sld>
+</file>
+
+<file path=ppt/slides/slide10.xml><?xml version="1.0" encoding="utf-8"?>
+<p:sld xmlns:a="http://schemas.openxmlformats.org/drawingml/2006/main" xmlns:r="http://schemas.openxmlformats.org/officeDocument/2006/relationships" xmlns:p="http://schemas.openxmlformats.org/presentationml/2006/main">
+  <p:cSld>
+    <p:spTree>
+      <p:nvGrpSpPr>
+        <p:cNvPr id="1" name=""/>
+        <p:cNvGrpSpPr/>
+        <p:nvPr/>
+      </p:nvGrpSpPr>
+      <p:grpSpPr>
+        <a:xfrm>
+          <a:off x="0" y="0"/>
+          <a:ext cx="0" cy="0"/>
+          <a:chOff x="0" y="0"/>
+          <a:chExt cx="0" cy="0"/>
+        </a:xfrm>
+      </p:grpSpPr>
+      <p:sp>
+        <p:nvSpPr>
+          <p:cNvPr id="2" name="Title 1"/>
+          <p:cNvSpPr>
+            <a:spLocks noGrp="1"/>
+          </p:cNvSpPr>
+          <p:nvPr>
+            <p:ph type="title"/>
+          </p:nvPr>
+        </p:nvSpPr>
+        <p:spPr/>
+        <p:txBody>
+          <a:bodyPr/>
+          <a:lstStyle/>
+          <a:p>
+            <a:r>
+              <a:rPr lang="en-US" dirty="0" smtClean="0"/>
+              <a:t>Horizontal Integration between Apps</a:t>
+            </a:r>
+            <a:endParaRPr lang="en-US" dirty="0"/>
+          </a:p>
+        </p:txBody>
+      </p:sp>
+      <p:sp>
+        <p:nvSpPr>
+          <p:cNvPr id="3" name="Content Placeholder 2"/>
+          <p:cNvSpPr>
+            <a:spLocks noGrp="1"/>
+          </p:cNvSpPr>
+          <p:nvPr>
+            <p:ph idx="1"/>
+          </p:nvPr>
+        </p:nvSpPr>
+        <p:spPr/>
+        <p:txBody>
+          <a:bodyPr/>
+          <a:lstStyle/>
+          <a:p>
+            <a:endParaRPr lang="en-US" dirty="0"/>
+          </a:p>
+        </p:txBody>
+      </p:sp>
+    </p:spTree>
+    <p:extLst>
+      <p:ext uri="{BB962C8B-B14F-4D97-AF65-F5344CB8AC3E}">
+        <p14:creationId xmlns:p14="http://schemas.microsoft.com/office/powerpoint/2010/main" val="3275097277"/>
       </p:ext>
     </p:extLst>
   </p:cSld>
@@ -3798,25 +3873,30 @@
           </a:p>
         </p:txBody>
       </p:sp>
-      <p:sp>
-        <p:nvSpPr>
-          <p:cNvPr id="3" name="Content Placeholder 2"/>
-          <p:cNvSpPr>
-            <a:spLocks noGrp="1"/>
-          </p:cNvSpPr>
-          <p:nvPr>
-            <p:ph idx="1"/>
-          </p:nvPr>
-        </p:nvSpPr>
-        <p:spPr/>
-        <p:txBody>
-          <a:bodyPr/>
-          <a:lstStyle/>
-          <a:p>
-            <a:endParaRPr lang="en-US"/>
-          </a:p>
-        </p:txBody>
-      </p:sp>
+      <p:pic>
+        <p:nvPicPr>
+          <p:cNvPr id="4" name="Picture 3"/>
+          <p:cNvPicPr>
+            <a:picLocks noChangeAspect="1"/>
+          </p:cNvPicPr>
+          <p:nvPr/>
+        </p:nvPicPr>
+        <p:blipFill>
+          <a:blip r:embed="rId2"/>
+          <a:stretch>
+            <a:fillRect/>
+          </a:stretch>
+        </p:blipFill>
+        <p:spPr>
+          <a:xfrm>
+            <a:off x="973166" y="1899693"/>
+            <a:ext cx="9777565" cy="2205350"/>
+          </a:xfrm>
+          <a:prstGeom prst="rect">
+            <a:avLst/>
+          </a:prstGeom>
+        </p:spPr>
+      </p:pic>
     </p:spTree>
     <p:extLst>
       <p:ext uri="{BB962C8B-B14F-4D97-AF65-F5344CB8AC3E}">
@@ -3862,33 +3942,315 @@
           <a:bodyPr/>
           <a:lstStyle/>
           <a:p>
-            <a:endParaRPr lang="en-US"/>
-          </a:p>
-        </p:txBody>
-      </p:sp>
-      <p:sp>
-        <p:nvSpPr>
-          <p:cNvPr id="3" name="Content Placeholder 2"/>
-          <p:cNvSpPr>
-            <a:spLocks noGrp="1"/>
-          </p:cNvSpPr>
-          <p:nvPr>
-            <p:ph idx="1"/>
-          </p:nvPr>
-        </p:nvSpPr>
-        <p:spPr/>
-        <p:txBody>
-          <a:bodyPr/>
-          <a:lstStyle/>
-          <a:p>
-            <a:endParaRPr lang="en-US"/>
-          </a:p>
-        </p:txBody>
-      </p:sp>
+            <a:r>
+              <a:rPr lang="en-US" dirty="0" smtClean="0"/>
+              <a:t>Protocols</a:t>
+            </a:r>
+            <a:endParaRPr lang="en-US" dirty="0"/>
+          </a:p>
+        </p:txBody>
+      </p:sp>
+      <p:pic>
+        <p:nvPicPr>
+          <p:cNvPr id="4" name="Picture 3"/>
+          <p:cNvPicPr>
+            <a:picLocks noChangeAspect="1"/>
+          </p:cNvPicPr>
+          <p:nvPr/>
+        </p:nvPicPr>
+        <p:blipFill>
+          <a:blip r:embed="rId2"/>
+          <a:stretch>
+            <a:fillRect/>
+          </a:stretch>
+        </p:blipFill>
+        <p:spPr>
+          <a:xfrm>
+            <a:off x="2796132" y="1458821"/>
+            <a:ext cx="5733914" cy="4653842"/>
+          </a:xfrm>
+          <a:prstGeom prst="rect">
+            <a:avLst/>
+          </a:prstGeom>
+        </p:spPr>
+      </p:pic>
     </p:spTree>
     <p:extLst>
       <p:ext uri="{BB962C8B-B14F-4D97-AF65-F5344CB8AC3E}">
         <p14:creationId xmlns:p14="http://schemas.microsoft.com/office/powerpoint/2010/main" val="2819278989"/>
+      </p:ext>
+    </p:extLst>
+  </p:cSld>
+  <p:clrMapOvr>
+    <a:masterClrMapping/>
+  </p:clrMapOvr>
+</p:sld>
+</file>
+
+<file path=ppt/slides/slide8.xml><?xml version="1.0" encoding="utf-8"?>
+<p:sld xmlns:a="http://schemas.openxmlformats.org/drawingml/2006/main" xmlns:r="http://schemas.openxmlformats.org/officeDocument/2006/relationships" xmlns:p="http://schemas.openxmlformats.org/presentationml/2006/main">
+  <p:cSld>
+    <p:spTree>
+      <p:nvGrpSpPr>
+        <p:cNvPr id="1" name=""/>
+        <p:cNvGrpSpPr/>
+        <p:nvPr/>
+      </p:nvGrpSpPr>
+      <p:grpSpPr>
+        <a:xfrm>
+          <a:off x="0" y="0"/>
+          <a:ext cx="0" cy="0"/>
+          <a:chOff x="0" y="0"/>
+          <a:chExt cx="0" cy="0"/>
+        </a:xfrm>
+      </p:grpSpPr>
+      <p:sp>
+        <p:nvSpPr>
+          <p:cNvPr id="2" name="Title 1"/>
+          <p:cNvSpPr>
+            <a:spLocks noGrp="1"/>
+          </p:cNvSpPr>
+          <p:nvPr>
+            <p:ph type="title"/>
+          </p:nvPr>
+        </p:nvSpPr>
+        <p:spPr/>
+        <p:txBody>
+          <a:bodyPr/>
+          <a:lstStyle/>
+          <a:p>
+            <a:r>
+              <a:rPr lang="en-US" dirty="0" smtClean="0"/>
+              <a:t>Challenges</a:t>
+            </a:r>
+            <a:endParaRPr lang="en-US" dirty="0"/>
+          </a:p>
+        </p:txBody>
+      </p:sp>
+      <p:sp>
+        <p:nvSpPr>
+          <p:cNvPr id="3" name="Content Placeholder 2"/>
+          <p:cNvSpPr>
+            <a:spLocks noGrp="1"/>
+          </p:cNvSpPr>
+          <p:nvPr>
+            <p:ph idx="1"/>
+          </p:nvPr>
+        </p:nvSpPr>
+        <p:spPr>
+          <a:xfrm>
+            <a:off x="838200" y="1433739"/>
+            <a:ext cx="10515600" cy="4927871"/>
+          </a:xfrm>
+        </p:spPr>
+        <p:txBody>
+          <a:bodyPr>
+            <a:normAutofit fontScale="92500" lnSpcReduction="20000"/>
+          </a:bodyPr>
+          <a:lstStyle/>
+          <a:p>
+            <a:r>
+              <a:rPr lang="en-US" dirty="0" smtClean="0"/>
+              <a:t>Availability</a:t>
+            </a:r>
+          </a:p>
+          <a:p>
+            <a:pPr lvl="1"/>
+            <a:r>
+              <a:rPr lang="en-US" dirty="0" smtClean="0"/>
+              <a:t>Access to hardware and software</a:t>
+            </a:r>
+          </a:p>
+          <a:p>
+            <a:r>
+              <a:rPr lang="en-US" dirty="0" smtClean="0"/>
+              <a:t>Reliability</a:t>
+            </a:r>
+          </a:p>
+          <a:p>
+            <a:pPr lvl="1"/>
+            <a:r>
+              <a:rPr lang="en-US" dirty="0" smtClean="0"/>
+              <a:t>Dependability of hardware and software</a:t>
+            </a:r>
+          </a:p>
+          <a:p>
+            <a:r>
+              <a:rPr lang="en-US" dirty="0" smtClean="0"/>
+              <a:t>Mobility</a:t>
+            </a:r>
+          </a:p>
+          <a:p>
+            <a:pPr lvl="1"/>
+            <a:r>
+              <a:rPr lang="en-US" dirty="0" smtClean="0"/>
+              <a:t>Delivery and management</a:t>
+            </a:r>
+          </a:p>
+          <a:p>
+            <a:r>
+              <a:rPr lang="en-US" dirty="0" smtClean="0"/>
+              <a:t>Performance</a:t>
+            </a:r>
+          </a:p>
+          <a:p>
+            <a:pPr lvl="1"/>
+            <a:r>
+              <a:rPr lang="en-US" dirty="0" smtClean="0"/>
+              <a:t>Components and protocols</a:t>
+            </a:r>
+          </a:p>
+          <a:p>
+            <a:r>
+              <a:rPr lang="en-US" dirty="0" smtClean="0"/>
+              <a:t>Management </a:t>
+            </a:r>
+          </a:p>
+          <a:p>
+            <a:pPr lvl="1"/>
+            <a:r>
+              <a:rPr lang="en-US" dirty="0" smtClean="0"/>
+              <a:t>Light weight FCAPS of billions of devices</a:t>
+            </a:r>
+          </a:p>
+          <a:p>
+            <a:r>
+              <a:rPr lang="en-US" dirty="0" smtClean="0"/>
+              <a:t>Interoperability</a:t>
+            </a:r>
+          </a:p>
+          <a:p>
+            <a:pPr lvl="1"/>
+            <a:r>
+              <a:rPr lang="en-US" dirty="0" smtClean="0"/>
+              <a:t>Applications and devices</a:t>
+            </a:r>
+          </a:p>
+          <a:p>
+            <a:r>
+              <a:rPr lang="en-US" dirty="0" smtClean="0"/>
+              <a:t>Security and Privacy</a:t>
+            </a:r>
+          </a:p>
+          <a:p>
+            <a:pPr lvl="1"/>
+            <a:r>
+              <a:rPr lang="en-US" dirty="0" smtClean="0"/>
+              <a:t>CIA among smaller devices</a:t>
+            </a:r>
+          </a:p>
+        </p:txBody>
+      </p:sp>
+    </p:spTree>
+    <p:extLst>
+      <p:ext uri="{BB962C8B-B14F-4D97-AF65-F5344CB8AC3E}">
+        <p14:creationId xmlns:p14="http://schemas.microsoft.com/office/powerpoint/2010/main" val="1329984945"/>
+      </p:ext>
+    </p:extLst>
+  </p:cSld>
+  <p:clrMapOvr>
+    <a:masterClrMapping/>
+  </p:clrMapOvr>
+</p:sld>
+</file>
+
+<file path=ppt/slides/slide9.xml><?xml version="1.0" encoding="utf-8"?>
+<p:sld xmlns:a="http://schemas.openxmlformats.org/drawingml/2006/main" xmlns:r="http://schemas.openxmlformats.org/officeDocument/2006/relationships" xmlns:p="http://schemas.openxmlformats.org/presentationml/2006/main">
+  <p:cSld>
+    <p:spTree>
+      <p:nvGrpSpPr>
+        <p:cNvPr id="1" name=""/>
+        <p:cNvGrpSpPr/>
+        <p:nvPr/>
+      </p:nvGrpSpPr>
+      <p:grpSpPr>
+        <a:xfrm>
+          <a:off x="0" y="0"/>
+          <a:ext cx="0" cy="0"/>
+          <a:chOff x="0" y="0"/>
+          <a:chExt cx="0" cy="0"/>
+        </a:xfrm>
+      </p:grpSpPr>
+      <p:sp>
+        <p:nvSpPr>
+          <p:cNvPr id="2" name="Title 1"/>
+          <p:cNvSpPr>
+            <a:spLocks noGrp="1"/>
+          </p:cNvSpPr>
+          <p:nvPr>
+            <p:ph type="title"/>
+          </p:nvPr>
+        </p:nvSpPr>
+        <p:spPr>
+          <a:xfrm>
+            <a:off x="839788" y="457200"/>
+            <a:ext cx="5038498" cy="1074148"/>
+          </a:xfrm>
+        </p:spPr>
+        <p:txBody>
+          <a:bodyPr/>
+          <a:lstStyle/>
+          <a:p>
+            <a:r>
+              <a:rPr lang="en-US" dirty="0" smtClean="0"/>
+              <a:t>Big Data, Cloud and Fog</a:t>
+            </a:r>
+            <a:endParaRPr lang="en-US" dirty="0"/>
+          </a:p>
+        </p:txBody>
+      </p:sp>
+      <p:sp>
+        <p:nvSpPr>
+          <p:cNvPr id="7" name="Text Placeholder 6"/>
+          <p:cNvSpPr>
+            <a:spLocks noGrp="1"/>
+          </p:cNvSpPr>
+          <p:nvPr>
+            <p:ph type="body" sz="half" idx="2"/>
+          </p:nvPr>
+        </p:nvSpPr>
+        <p:spPr>
+          <a:xfrm>
+            <a:off x="839788" y="1841863"/>
+            <a:ext cx="5038498" cy="4258491"/>
+          </a:xfrm>
+        </p:spPr>
+        <p:txBody>
+          <a:bodyPr/>
+          <a:lstStyle/>
+          <a:p>
+            <a:endParaRPr lang="en-US" dirty="0"/>
+          </a:p>
+        </p:txBody>
+      </p:sp>
+      <p:pic>
+        <p:nvPicPr>
+          <p:cNvPr id="9" name="Picture 8"/>
+          <p:cNvPicPr>
+            <a:picLocks noChangeAspect="1"/>
+          </p:cNvPicPr>
+          <p:nvPr/>
+        </p:nvPicPr>
+        <p:blipFill>
+          <a:blip r:embed="rId2"/>
+          <a:stretch>
+            <a:fillRect/>
+          </a:stretch>
+        </p:blipFill>
+        <p:spPr>
+          <a:xfrm>
+            <a:off x="6044701" y="1531348"/>
+            <a:ext cx="5573028" cy="3955052"/>
+          </a:xfrm>
+          <a:prstGeom prst="rect">
+            <a:avLst/>
+          </a:prstGeom>
+        </p:spPr>
+      </p:pic>
+    </p:spTree>
+    <p:extLst>
+      <p:ext uri="{BB962C8B-B14F-4D97-AF65-F5344CB8AC3E}">
+        <p14:creationId xmlns:p14="http://schemas.microsoft.com/office/powerpoint/2010/main" val="585514322"/>
       </p:ext>
     </p:extLst>
   </p:cSld>

</xml_diff>

<commit_message>
Final first draft - each member needs to pick topics and add their slides
</commit_message>
<xml_diff>
--- a/PaperPresentation.pptx
+++ b/PaperPresentation.pptx
@@ -15,6 +15,7 @@
     <p:sldId id="263" r:id="rId9"/>
     <p:sldId id="264" r:id="rId10"/>
     <p:sldId id="265" r:id="rId11"/>
+    <p:sldId id="266" r:id="rId12"/>
   </p:sldIdLst>
   <p:sldSz cx="12192000" cy="6858000"/>
   <p:notesSz cx="6858000" cy="9144000"/>
@@ -3134,40 +3135,108 @@
         </p:nvSpPr>
         <p:spPr/>
         <p:txBody>
-          <a:bodyPr/>
-          <a:lstStyle/>
-          <a:p>
-            <a:r>
-              <a:rPr lang="en-US" dirty="0" smtClean="0"/>
-              <a:t>Horizontal Integration between Apps</a:t>
-            </a:r>
-            <a:endParaRPr lang="en-US" dirty="0"/>
-          </a:p>
-        </p:txBody>
-      </p:sp>
-      <p:sp>
-        <p:nvSpPr>
-          <p:cNvPr id="3" name="Content Placeholder 2"/>
-          <p:cNvSpPr>
-            <a:spLocks noGrp="1"/>
-          </p:cNvSpPr>
+          <a:bodyPr>
+            <a:normAutofit/>
+          </a:bodyPr>
+          <a:lstStyle/>
+          <a:p>
+            <a:r>
+              <a:rPr lang="en-US" sz="3600" dirty="0" smtClean="0"/>
+              <a:t>Horizontal Integration between Application Protocols</a:t>
+            </a:r>
+            <a:endParaRPr lang="en-US" sz="3600" dirty="0"/>
+          </a:p>
+        </p:txBody>
+      </p:sp>
+      <p:pic>
+        <p:nvPicPr>
+          <p:cNvPr id="4" name="Content Placeholder 3"/>
+          <p:cNvPicPr>
+            <a:picLocks noGrp="1" noChangeAspect="1"/>
+          </p:cNvPicPr>
           <p:nvPr>
             <p:ph idx="1"/>
           </p:nvPr>
-        </p:nvSpPr>
-        <p:spPr/>
-        <p:txBody>
-          <a:bodyPr/>
-          <a:lstStyle/>
-          <a:p>
-            <a:endParaRPr lang="en-US" dirty="0"/>
-          </a:p>
-        </p:txBody>
-      </p:sp>
+        </p:nvPicPr>
+        <p:blipFill>
+          <a:blip r:embed="rId2"/>
+          <a:stretch>
+            <a:fillRect/>
+          </a:stretch>
+        </p:blipFill>
+        <p:spPr>
+          <a:xfrm>
+            <a:off x="974836" y="1894114"/>
+            <a:ext cx="9778135" cy="4023360"/>
+          </a:xfrm>
+          <a:prstGeom prst="rect">
+            <a:avLst/>
+          </a:prstGeom>
+        </p:spPr>
+      </p:pic>
     </p:spTree>
     <p:extLst>
       <p:ext uri="{BB962C8B-B14F-4D97-AF65-F5344CB8AC3E}">
         <p14:creationId xmlns:p14="http://schemas.microsoft.com/office/powerpoint/2010/main" val="3275097277"/>
+      </p:ext>
+    </p:extLst>
+  </p:cSld>
+  <p:clrMapOvr>
+    <a:masterClrMapping/>
+  </p:clrMapOvr>
+</p:sld>
+</file>
+
+<file path=ppt/slides/slide11.xml><?xml version="1.0" encoding="utf-8"?>
+<p:sld xmlns:a="http://schemas.openxmlformats.org/drawingml/2006/main" xmlns:r="http://schemas.openxmlformats.org/officeDocument/2006/relationships" xmlns:p="http://schemas.openxmlformats.org/presentationml/2006/main">
+  <p:cSld>
+    <p:spTree>
+      <p:nvGrpSpPr>
+        <p:cNvPr id="1" name=""/>
+        <p:cNvGrpSpPr/>
+        <p:nvPr/>
+      </p:nvGrpSpPr>
+      <p:grpSpPr>
+        <a:xfrm>
+          <a:off x="0" y="0"/>
+          <a:ext cx="0" cy="0"/>
+          <a:chOff x="0" y="0"/>
+          <a:chExt cx="0" cy="0"/>
+        </a:xfrm>
+      </p:grpSpPr>
+      <p:sp>
+        <p:nvSpPr>
+          <p:cNvPr id="2" name="Title 1"/>
+          <p:cNvSpPr>
+            <a:spLocks noGrp="1"/>
+          </p:cNvSpPr>
+          <p:nvPr>
+            <p:ph type="title"/>
+          </p:nvPr>
+        </p:nvSpPr>
+        <p:spPr>
+          <a:xfrm>
+            <a:off x="968828" y="1802675"/>
+            <a:ext cx="10515600" cy="1756002"/>
+          </a:xfrm>
+        </p:spPr>
+        <p:txBody>
+          <a:bodyPr/>
+          <a:lstStyle/>
+          <a:p>
+            <a:pPr algn="ctr"/>
+            <a:r>
+              <a:rPr lang="en-US" dirty="0" smtClean="0"/>
+              <a:t>Thank You!</a:t>
+            </a:r>
+            <a:endParaRPr lang="en-US" dirty="0"/>
+          </a:p>
+        </p:txBody>
+      </p:sp>
+    </p:spTree>
+    <p:extLst>
+      <p:ext uri="{BB962C8B-B14F-4D97-AF65-F5344CB8AC3E}">
+        <p14:creationId xmlns:p14="http://schemas.microsoft.com/office/powerpoint/2010/main" val="15996175"/>
       </p:ext>
     </p:extLst>
   </p:cSld>
@@ -4211,15 +4280,91 @@
         </p:nvSpPr>
         <p:spPr>
           <a:xfrm>
-            <a:off x="839788" y="1841863"/>
-            <a:ext cx="5038498" cy="4258491"/>
+            <a:off x="839788" y="1672047"/>
+            <a:ext cx="5038498" cy="4428308"/>
           </a:xfrm>
         </p:spPr>
         <p:txBody>
-          <a:bodyPr/>
-          <a:lstStyle/>
-          <a:p>
-            <a:endParaRPr lang="en-US" dirty="0"/>
+          <a:bodyPr>
+            <a:normAutofit/>
+          </a:bodyPr>
+          <a:lstStyle/>
+          <a:p>
+            <a:pPr marL="285750" indent="-285750">
+              <a:buFont typeface="Arial" panose="020B0604020202020204" pitchFamily="34" charset="0"/>
+              <a:buChar char="•"/>
+            </a:pPr>
+            <a:r>
+              <a:rPr lang="en-US" sz="2400" dirty="0" smtClean="0"/>
+              <a:t>Analytics in real time on big data</a:t>
+            </a:r>
+          </a:p>
+          <a:p>
+            <a:pPr marL="742950" lvl="1" indent="-285750">
+              <a:buFont typeface="Arial" panose="020B0604020202020204" pitchFamily="34" charset="0"/>
+              <a:buChar char="•"/>
+            </a:pPr>
+            <a:r>
+              <a:rPr lang="en-US" sz="2400" dirty="0" smtClean="0"/>
+              <a:t>Time Series Database (Modified Hadoop at FB)</a:t>
+            </a:r>
+          </a:p>
+          <a:p>
+            <a:pPr marL="285750" indent="-285750">
+              <a:buFont typeface="Arial" panose="020B0604020202020204" pitchFamily="34" charset="0"/>
+              <a:buChar char="•"/>
+            </a:pPr>
+            <a:r>
+              <a:rPr lang="en-US" sz="2400" dirty="0" smtClean="0"/>
+              <a:t>Cloud Computing</a:t>
+            </a:r>
+          </a:p>
+          <a:p>
+            <a:pPr marL="742950" lvl="1" indent="-285750">
+              <a:buFont typeface="Arial" panose="020B0604020202020204" pitchFamily="34" charset="0"/>
+              <a:buChar char="•"/>
+            </a:pPr>
+            <a:r>
+              <a:rPr lang="en-US" sz="2400" dirty="0" smtClean="0"/>
+              <a:t>Challenges and Platforms (</a:t>
+            </a:r>
+            <a:r>
+              <a:rPr lang="en-US" sz="2400" dirty="0" err="1" smtClean="0"/>
+              <a:t>Xively</a:t>
+            </a:r>
+            <a:r>
+              <a:rPr lang="en-US" sz="2400" dirty="0" smtClean="0"/>
+              <a:t> </a:t>
+            </a:r>
+            <a:r>
+              <a:rPr lang="en-US" sz="2400" dirty="0" err="1" smtClean="0"/>
+              <a:t>Nimbits</a:t>
+            </a:r>
+            <a:r>
+              <a:rPr lang="en-US" sz="2400" dirty="0" smtClean="0"/>
+              <a:t>)</a:t>
+            </a:r>
+          </a:p>
+          <a:p>
+            <a:pPr marL="285750" indent="-285750">
+              <a:buFont typeface="Arial" panose="020B0604020202020204" pitchFamily="34" charset="0"/>
+              <a:buChar char="•"/>
+            </a:pPr>
+            <a:r>
+              <a:rPr lang="en-US" sz="2400" dirty="0" smtClean="0"/>
+              <a:t>Fog Computing</a:t>
+            </a:r>
+          </a:p>
+          <a:p>
+            <a:pPr marL="742950" lvl="1" indent="-285750">
+              <a:buFont typeface="Arial" panose="020B0604020202020204" pitchFamily="34" charset="0"/>
+              <a:buChar char="•"/>
+            </a:pPr>
+            <a:r>
+              <a:rPr lang="en-US" sz="2400" dirty="0" smtClean="0"/>
+              <a:t>Cloudlet or edge computing improving interaction with cloud</a:t>
+            </a:r>
+            <a:endParaRPr lang="en-US" sz="2400" dirty="0"/>
           </a:p>
         </p:txBody>
       </p:sp>
@@ -4239,8 +4384,8 @@
         </p:blipFill>
         <p:spPr>
           <a:xfrm>
-            <a:off x="6044701" y="1531348"/>
-            <a:ext cx="5573028" cy="3955052"/>
+            <a:off x="5878286" y="994274"/>
+            <a:ext cx="6146722" cy="4898571"/>
           </a:xfrm>
           <a:prstGeom prst="rect">
             <a:avLst/>

</xml_diff>

<commit_message>
Slide with division of work
</commit_message>
<xml_diff>
--- a/PaperPresentation.pptx
+++ b/PaperPresentation.pptx
@@ -114,6 +114,11 @@
       </a:defRPr>
     </a:lvl9pPr>
   </p:defaultTextStyle>
+  <p:extLst>
+    <p:ext uri="{EFAFB233-063F-42B5-8137-9DF3F51BA10A}">
+      <p15:sldGuideLst xmlns:p15="http://schemas.microsoft.com/office/powerpoint/2012/main"/>
+    </p:ext>
+  </p:extLst>
 </p:presentation>
 </file>
 
@@ -248,7 +253,7 @@
           <a:p>
             <a:fld id="{F5C2D3CA-0C88-4499-93D0-C2E81B817E80}" type="datetimeFigureOut">
               <a:rPr lang="en-US" smtClean="0"/>
-              <a:t>3/15/2016</a:t>
+              <a:t>3/16/2016</a:t>
             </a:fld>
             <a:endParaRPr lang="en-US"/>
           </a:p>
@@ -418,7 +423,7 @@
           <a:p>
             <a:fld id="{F5C2D3CA-0C88-4499-93D0-C2E81B817E80}" type="datetimeFigureOut">
               <a:rPr lang="en-US" smtClean="0"/>
-              <a:t>3/15/2016</a:t>
+              <a:t>3/16/2016</a:t>
             </a:fld>
             <a:endParaRPr lang="en-US"/>
           </a:p>
@@ -598,7 +603,7 @@
           <a:p>
             <a:fld id="{F5C2D3CA-0C88-4499-93D0-C2E81B817E80}" type="datetimeFigureOut">
               <a:rPr lang="en-US" smtClean="0"/>
-              <a:t>3/15/2016</a:t>
+              <a:t>3/16/2016</a:t>
             </a:fld>
             <a:endParaRPr lang="en-US"/>
           </a:p>
@@ -768,7 +773,7 @@
           <a:p>
             <a:fld id="{F5C2D3CA-0C88-4499-93D0-C2E81B817E80}" type="datetimeFigureOut">
               <a:rPr lang="en-US" smtClean="0"/>
-              <a:t>3/15/2016</a:t>
+              <a:t>3/16/2016</a:t>
             </a:fld>
             <a:endParaRPr lang="en-US"/>
           </a:p>
@@ -1014,7 +1019,7 @@
           <a:p>
             <a:fld id="{F5C2D3CA-0C88-4499-93D0-C2E81B817E80}" type="datetimeFigureOut">
               <a:rPr lang="en-US" smtClean="0"/>
-              <a:t>3/15/2016</a:t>
+              <a:t>3/16/2016</a:t>
             </a:fld>
             <a:endParaRPr lang="en-US"/>
           </a:p>
@@ -1246,7 +1251,7 @@
           <a:p>
             <a:fld id="{F5C2D3CA-0C88-4499-93D0-C2E81B817E80}" type="datetimeFigureOut">
               <a:rPr lang="en-US" smtClean="0"/>
-              <a:t>3/15/2016</a:t>
+              <a:t>3/16/2016</a:t>
             </a:fld>
             <a:endParaRPr lang="en-US"/>
           </a:p>
@@ -1613,7 +1618,7 @@
           <a:p>
             <a:fld id="{F5C2D3CA-0C88-4499-93D0-C2E81B817E80}" type="datetimeFigureOut">
               <a:rPr lang="en-US" smtClean="0"/>
-              <a:t>3/15/2016</a:t>
+              <a:t>3/16/2016</a:t>
             </a:fld>
             <a:endParaRPr lang="en-US"/>
           </a:p>
@@ -1731,7 +1736,7 @@
           <a:p>
             <a:fld id="{F5C2D3CA-0C88-4499-93D0-C2E81B817E80}" type="datetimeFigureOut">
               <a:rPr lang="en-US" smtClean="0"/>
-              <a:t>3/15/2016</a:t>
+              <a:t>3/16/2016</a:t>
             </a:fld>
             <a:endParaRPr lang="en-US"/>
           </a:p>
@@ -1826,7 +1831,7 @@
           <a:p>
             <a:fld id="{F5C2D3CA-0C88-4499-93D0-C2E81B817E80}" type="datetimeFigureOut">
               <a:rPr lang="en-US" smtClean="0"/>
-              <a:t>3/15/2016</a:t>
+              <a:t>3/16/2016</a:t>
             </a:fld>
             <a:endParaRPr lang="en-US"/>
           </a:p>
@@ -2103,7 +2108,7 @@
           <a:p>
             <a:fld id="{F5C2D3CA-0C88-4499-93D0-C2E81B817E80}" type="datetimeFigureOut">
               <a:rPr lang="en-US" smtClean="0"/>
-              <a:t>3/15/2016</a:t>
+              <a:t>3/16/2016</a:t>
             </a:fld>
             <a:endParaRPr lang="en-US"/>
           </a:p>
@@ -2356,7 +2361,7 @@
           <a:p>
             <a:fld id="{F5C2D3CA-0C88-4499-93D0-C2E81B817E80}" type="datetimeFigureOut">
               <a:rPr lang="en-US" smtClean="0"/>
-              <a:t>3/15/2016</a:t>
+              <a:t>3/16/2016</a:t>
             </a:fld>
             <a:endParaRPr lang="en-US"/>
           </a:p>
@@ -2569,7 +2574,7 @@
           <a:p>
             <a:fld id="{F5C2D3CA-0C88-4499-93D0-C2E81B817E80}" type="datetimeFigureOut">
               <a:rPr lang="en-US" smtClean="0"/>
-              <a:t>3/15/2016</a:t>
+              <a:t>3/16/2016</a:t>
             </a:fld>
             <a:endParaRPr lang="en-US"/>
           </a:p>
@@ -3006,11 +3011,7 @@
             </a:r>
             <a:r>
               <a:rPr lang="en-US" dirty="0" smtClean="0"/>
-              <a:t> </a:t>
-            </a:r>
-            <a:r>
-              <a:rPr lang="en-US" dirty="0" smtClean="0"/>
-              <a:t>Ecosystem</a:t>
+              <a:t> Ecosystem</a:t>
             </a:r>
             <a:endParaRPr lang="en-US" dirty="0"/>
           </a:p>
@@ -3463,51 +3464,132 @@
             <p:ph idx="1"/>
           </p:nvPr>
         </p:nvSpPr>
-        <p:spPr/>
-        <p:txBody>
-          <a:bodyPr/>
-          <a:lstStyle/>
-          <a:p>
-            <a:r>
-              <a:rPr lang="en-US" dirty="0" smtClean="0"/>
-              <a:t>Architecture</a:t>
+        <p:spPr>
+          <a:xfrm>
+            <a:off x="838200" y="1838688"/>
+            <a:ext cx="10515600" cy="4351338"/>
+          </a:xfrm>
+        </p:spPr>
+        <p:txBody>
+          <a:bodyPr>
+            <a:normAutofit lnSpcReduction="10000"/>
+          </a:bodyPr>
+          <a:lstStyle/>
+          <a:p>
+            <a:r>
+              <a:rPr lang="en-US" dirty="0" smtClean="0"/>
+              <a:t>Architecture - Hamza</a:t>
+            </a:r>
+          </a:p>
+          <a:p>
+            <a:r>
+              <a:rPr lang="en-US" dirty="0" smtClean="0"/>
+              <a:t>Elements - </a:t>
+            </a:r>
+            <a:r>
+              <a:rPr lang="en-US" dirty="0" err="1" smtClean="0"/>
+              <a:t>Hiranava</a:t>
+            </a:r>
+            <a:endParaRPr lang="en-US" dirty="0" smtClean="0"/>
+          </a:p>
+          <a:p>
+            <a:r>
+              <a:rPr lang="en-US" dirty="0" smtClean="0"/>
+              <a:t>Protocols – </a:t>
             </a:r>
           </a:p>
           <a:p>
             <a:pPr lvl="1"/>
             <a:r>
               <a:rPr lang="en-US" dirty="0" smtClean="0"/>
-              <a:t>A</a:t>
-            </a:r>
-          </a:p>
-          <a:p>
-            <a:r>
-              <a:rPr lang="en-US" dirty="0" smtClean="0"/>
-              <a:t>Protocols</a:t>
-            </a:r>
-          </a:p>
-          <a:p>
-            <a:r>
-              <a:rPr lang="en-US" dirty="0" smtClean="0"/>
-              <a:t>Security </a:t>
+              <a:t>Application-</a:t>
             </a:r>
             <a:r>
               <a:rPr lang="en-US" dirty="0" err="1" smtClean="0"/>
-              <a:t>QoS</a:t>
+              <a:t>Sharique</a:t>
             </a:r>
             <a:endParaRPr lang="en-US" dirty="0" smtClean="0"/>
           </a:p>
           <a:p>
-            <a:r>
-              <a:rPr lang="en-US" dirty="0" smtClean="0"/>
-              <a:t>Big data</a:t>
-            </a:r>
-          </a:p>
-          <a:p>
-            <a:r>
-              <a:rPr lang="en-US" dirty="0" smtClean="0"/>
-              <a:t>Horizontal integration</a:t>
-            </a:r>
+            <a:pPr lvl="1"/>
+            <a:r>
+              <a:rPr lang="en-US" smtClean="0"/>
+              <a:t>Service Discovery-Suryansh</a:t>
+            </a:r>
+            <a:endParaRPr lang="en-US" dirty="0" smtClean="0"/>
+          </a:p>
+          <a:p>
+            <a:pPr lvl="1"/>
+            <a:r>
+              <a:rPr lang="en-US" dirty="0" smtClean="0"/>
+              <a:t>Infrastructure-</a:t>
+            </a:r>
+            <a:r>
+              <a:rPr lang="en-US" dirty="0" err="1" smtClean="0"/>
+              <a:t>Hiranava</a:t>
+            </a:r>
+            <a:endParaRPr lang="en-US" dirty="0" smtClean="0"/>
+          </a:p>
+          <a:p>
+            <a:pPr lvl="1"/>
+            <a:r>
+              <a:rPr lang="en-US" dirty="0"/>
+              <a:t>O</a:t>
+            </a:r>
+            <a:r>
+              <a:rPr lang="en-US" dirty="0" smtClean="0"/>
+              <a:t>thers-</a:t>
+            </a:r>
+            <a:r>
+              <a:rPr lang="en-US" dirty="0" err="1" smtClean="0"/>
+              <a:t>Hiranava</a:t>
+            </a:r>
+            <a:endParaRPr lang="en-US" dirty="0" smtClean="0"/>
+          </a:p>
+          <a:p>
+            <a:r>
+              <a:rPr lang="en-US" dirty="0" smtClean="0"/>
+              <a:t>Research Challenges - </a:t>
+            </a:r>
+            <a:r>
+              <a:rPr lang="en-US" dirty="0" err="1" smtClean="0"/>
+              <a:t>Suryansh</a:t>
+            </a:r>
+            <a:endParaRPr lang="en-US" dirty="0" smtClean="0"/>
+          </a:p>
+          <a:p>
+            <a:r>
+              <a:rPr lang="en-US" dirty="0" smtClean="0"/>
+              <a:t>Big </a:t>
+            </a:r>
+            <a:r>
+              <a:rPr lang="en-US" dirty="0" smtClean="0"/>
+              <a:t>data - </a:t>
+            </a:r>
+            <a:r>
+              <a:rPr lang="en-US" dirty="0"/>
+              <a:t>R</a:t>
+            </a:r>
+            <a:r>
+              <a:rPr lang="en-US" dirty="0" smtClean="0"/>
+              <a:t>ahul</a:t>
+            </a:r>
+            <a:endParaRPr lang="en-US" dirty="0" smtClean="0"/>
+          </a:p>
+          <a:p>
+            <a:r>
+              <a:rPr lang="en-US" dirty="0" smtClean="0"/>
+              <a:t>Horizontal </a:t>
+            </a:r>
+            <a:r>
+              <a:rPr lang="en-US" dirty="0" smtClean="0"/>
+              <a:t>integration- </a:t>
+            </a:r>
+            <a:r>
+              <a:rPr lang="en-US" dirty="0" err="1" smtClean="0"/>
+              <a:t>Sharique</a:t>
+            </a:r>
+            <a:endParaRPr lang="en-US" dirty="0" smtClean="0"/>
           </a:p>
         </p:txBody>
       </p:sp>

</xml_diff>